<commit_message>
Changed presentation, autowired loginbean to profilebean to get currentUser, added messages for feedback, added UserInputConverter
</commit_message>
<xml_diff>
--- a/Presentation/SVN-Sheepdog.pptx
+++ b/Presentation/SVN-Sheepdog.pptx
@@ -19,8 +19,8 @@
     <p:sldId id="267" r:id="rId10"/>
     <p:sldId id="268" r:id="rId11"/>
     <p:sldId id="269" r:id="rId12"/>
-    <p:sldId id="270" r:id="rId13"/>
-    <p:sldId id="275" r:id="rId14"/>
+    <p:sldId id="275" r:id="rId13"/>
+    <p:sldId id="270" r:id="rId14"/>
     <p:sldId id="271" r:id="rId15"/>
     <p:sldId id="272" r:id="rId16"/>
     <p:sldId id="273" r:id="rId17"/>
@@ -210,7 +210,7 @@
             <a:fld id="{A8322D77-4ACC-43D2-99E8-77DAF25475E3}" type="datetimeFigureOut">
               <a:rPr lang="ru-RU" smtClean="0"/>
               <a:pPr/>
-              <a:t>21.04.2014</a:t>
+              <a:t>22.04.2014</a:t>
             </a:fld>
             <a:endParaRPr lang="ru-RU"/>
           </a:p>
@@ -755,7 +755,7 @@
             <a:fld id="{A8D763D8-117A-47EC-8D38-60D80E5F93F0}" type="datetimeFigureOut">
               <a:rPr lang="ru-RU" smtClean="0"/>
               <a:pPr/>
-              <a:t>21.04.2014</a:t>
+              <a:t>22.04.2014</a:t>
             </a:fld>
             <a:endParaRPr lang="ru-RU"/>
           </a:p>
@@ -937,7 +937,7 @@
             <a:fld id="{A8D763D8-117A-47EC-8D38-60D80E5F93F0}" type="datetimeFigureOut">
               <a:rPr lang="ru-RU" smtClean="0"/>
               <a:pPr/>
-              <a:t>21.04.2014</a:t>
+              <a:t>22.04.2014</a:t>
             </a:fld>
             <a:endParaRPr lang="ru-RU"/>
           </a:p>
@@ -1129,7 +1129,7 @@
             <a:fld id="{A8D763D8-117A-47EC-8D38-60D80E5F93F0}" type="datetimeFigureOut">
               <a:rPr lang="ru-RU" smtClean="0"/>
               <a:pPr/>
-              <a:t>21.04.2014</a:t>
+              <a:t>22.04.2014</a:t>
             </a:fld>
             <a:endParaRPr lang="ru-RU"/>
           </a:p>
@@ -1311,7 +1311,7 @@
             <a:fld id="{A8D763D8-117A-47EC-8D38-60D80E5F93F0}" type="datetimeFigureOut">
               <a:rPr lang="ru-RU" smtClean="0"/>
               <a:pPr/>
-              <a:t>21.04.2014</a:t>
+              <a:t>22.04.2014</a:t>
             </a:fld>
             <a:endParaRPr lang="ru-RU"/>
           </a:p>
@@ -1515,7 +1515,7 @@
             <a:fld id="{A8D763D8-117A-47EC-8D38-60D80E5F93F0}" type="datetimeFigureOut">
               <a:rPr lang="ru-RU" smtClean="0"/>
               <a:pPr/>
-              <a:t>21.04.2014</a:t>
+              <a:t>22.04.2014</a:t>
             </a:fld>
             <a:endParaRPr lang="ru-RU"/>
           </a:p>
@@ -1815,7 +1815,7 @@
             <a:fld id="{A8D763D8-117A-47EC-8D38-60D80E5F93F0}" type="datetimeFigureOut">
               <a:rPr lang="ru-RU" smtClean="0"/>
               <a:pPr/>
-              <a:t>21.04.2014</a:t>
+              <a:t>22.04.2014</a:t>
             </a:fld>
             <a:endParaRPr lang="ru-RU"/>
           </a:p>
@@ -2254,7 +2254,7 @@
             <a:fld id="{A8D763D8-117A-47EC-8D38-60D80E5F93F0}" type="datetimeFigureOut">
               <a:rPr lang="ru-RU" smtClean="0"/>
               <a:pPr/>
-              <a:t>21.04.2014</a:t>
+              <a:t>22.04.2014</a:t>
             </a:fld>
             <a:endParaRPr lang="ru-RU"/>
           </a:p>
@@ -2384,7 +2384,7 @@
             <a:fld id="{A8D763D8-117A-47EC-8D38-60D80E5F93F0}" type="datetimeFigureOut">
               <a:rPr lang="ru-RU" smtClean="0"/>
               <a:pPr/>
-              <a:t>21.04.2014</a:t>
+              <a:t>22.04.2014</a:t>
             </a:fld>
             <a:endParaRPr lang="ru-RU"/>
           </a:p>
@@ -2491,7 +2491,7 @@
             <a:fld id="{A8D763D8-117A-47EC-8D38-60D80E5F93F0}" type="datetimeFigureOut">
               <a:rPr lang="ru-RU" smtClean="0"/>
               <a:pPr/>
-              <a:t>21.04.2014</a:t>
+              <a:t>22.04.2014</a:t>
             </a:fld>
             <a:endParaRPr lang="ru-RU"/>
           </a:p>
@@ -2780,7 +2780,7 @@
             <a:fld id="{A8D763D8-117A-47EC-8D38-60D80E5F93F0}" type="datetimeFigureOut">
               <a:rPr lang="ru-RU" smtClean="0"/>
               <a:pPr/>
-              <a:t>21.04.2014</a:t>
+              <a:t>22.04.2014</a:t>
             </a:fld>
             <a:endParaRPr lang="ru-RU"/>
           </a:p>
@@ -3049,7 +3049,7 @@
             <a:fld id="{A8D763D8-117A-47EC-8D38-60D80E5F93F0}" type="datetimeFigureOut">
               <a:rPr lang="ru-RU" smtClean="0"/>
               <a:pPr/>
-              <a:t>21.04.2014</a:t>
+              <a:t>22.04.2014</a:t>
             </a:fld>
             <a:endParaRPr lang="ru-RU"/>
           </a:p>
@@ -3306,7 +3306,7 @@
             <a:fld id="{A8D763D8-117A-47EC-8D38-60D80E5F93F0}" type="datetimeFigureOut">
               <a:rPr lang="ru-RU" smtClean="0"/>
               <a:pPr/>
-              <a:t>21.04.2014</a:t>
+              <a:t>22.04.2014</a:t>
             </a:fld>
             <a:endParaRPr lang="ru-RU"/>
           </a:p>
@@ -3977,7 +3977,7 @@
         <p:spPr>
           <a:xfrm>
             <a:off x="179512" y="762000"/>
-            <a:ext cx="8784976" cy="866800"/>
+            <a:ext cx="8784976" cy="1010816"/>
           </a:xfrm>
         </p:spPr>
         <p:txBody>
@@ -3990,7 +3990,22 @@
             </a:pPr>
             <a:r>
               <a:rPr lang="en-US" sz="2800" b="0" dirty="0" smtClean="0"/>
-              <a:t>SVN Services</a:t>
+              <a:t>SVN </a:t>
+            </a:r>
+            <a:r>
+              <a:rPr lang="en-US" sz="2800" b="0" dirty="0" smtClean="0"/>
+              <a:t>Services</a:t>
+            </a:r>
+            <a:endParaRPr lang="ru-RU" sz="2800" b="0" dirty="0" smtClean="0"/>
+          </a:p>
+          <a:p>
+            <a:pPr>
+              <a:buFont typeface="Arial" pitchFamily="34" charset="0"/>
+              <a:buChar char="•"/>
+            </a:pPr>
+            <a:r>
+              <a:rPr lang="en-US" sz="2800" b="0" dirty="0" err="1" smtClean="0"/>
+              <a:t>SVNKit</a:t>
             </a:r>
             <a:endParaRPr lang="ru-RU" sz="2800" b="0" dirty="0"/>
           </a:p>
@@ -4112,8 +4127,17 @@
             </a:pPr>
             <a:r>
               <a:rPr lang="en-US" sz="2800" b="0" dirty="0" smtClean="0"/>
-              <a:t>Mail service</a:t>
-            </a:r>
+              <a:t>Mail </a:t>
+            </a:r>
+            <a:r>
+              <a:rPr lang="en-US" sz="2800" b="0" dirty="0" smtClean="0"/>
+              <a:t>service </a:t>
+            </a:r>
+            <a:r>
+              <a:rPr lang="en-US" sz="2800" b="0" smtClean="0"/>
+              <a:t>(Velocity</a:t>
+            </a:r>
+            <a:endParaRPr lang="en-US" sz="2800" b="0" dirty="0" smtClean="0"/>
           </a:p>
           <a:p>
             <a:pPr>
@@ -4121,12 +4145,8 @@
               <a:buChar char="•"/>
             </a:pPr>
             <a:r>
-              <a:rPr lang="en-US" sz="2800" b="0" smtClean="0"/>
-              <a:t>Shepherd </a:t>
-            </a:r>
-            <a:r>
-              <a:rPr lang="en-US" sz="2800" b="0" smtClean="0"/>
-              <a:t>service</a:t>
+              <a:rPr lang="en-US" sz="2800" b="0" dirty="0" smtClean="0"/>
+              <a:t>Shepherd service</a:t>
             </a:r>
             <a:endParaRPr lang="ru-RU" sz="2800" b="0" dirty="0"/>
           </a:p>
@@ -4216,7 +4236,7 @@
           <a:p>
             <a:r>
               <a:rPr lang="en-US" dirty="0" smtClean="0"/>
-              <a:t>User Interface</a:t>
+              <a:t>Use Case</a:t>
             </a:r>
             <a:endParaRPr lang="ru-RU" dirty="0"/>
           </a:p>
@@ -4224,7 +4244,7 @@
       </p:sp>
       <p:pic>
         <p:nvPicPr>
-          <p:cNvPr id="26626" name="Picture 2" descr="C:\Users\Алёна\Presentation\UML\sheepdog_screens.jpg"/>
+          <p:cNvPr id="30722" name="Picture 2" descr="C:\Users\Алёна\Presentation\UML\sheepdog_usecase.jpg"/>
           <p:cNvPicPr>
             <a:picLocks noGrp="1" noChangeAspect="1" noChangeArrowheads="1"/>
           </p:cNvPicPr>
@@ -4241,8 +4261,8 @@
         </p:blipFill>
         <p:spPr bwMode="auto">
           <a:xfrm>
-            <a:off x="72007" y="1268760"/>
-            <a:ext cx="8964489" cy="4790626"/>
+            <a:off x="971600" y="692696"/>
+            <a:ext cx="6936998" cy="5715000"/>
           </a:xfrm>
           <a:prstGeom prst="rect">
             <a:avLst/>
@@ -4302,7 +4322,7 @@
           <a:p>
             <a:r>
               <a:rPr lang="en-US" dirty="0" smtClean="0"/>
-              <a:t>Use Case</a:t>
+              <a:t>User Interface</a:t>
             </a:r>
             <a:endParaRPr lang="ru-RU" dirty="0"/>
           </a:p>
@@ -4310,7 +4330,7 @@
       </p:sp>
       <p:pic>
         <p:nvPicPr>
-          <p:cNvPr id="30722" name="Picture 2" descr="C:\Users\Алёна\Presentation\UML\sheepdog_usecase.jpg"/>
+          <p:cNvPr id="26626" name="Picture 2" descr="C:\Users\Алёна\Presentation\UML\sheepdog_screens.jpg"/>
           <p:cNvPicPr>
             <a:picLocks noGrp="1" noChangeAspect="1" noChangeArrowheads="1"/>
           </p:cNvPicPr>
@@ -4327,8 +4347,8 @@
         </p:blipFill>
         <p:spPr bwMode="auto">
           <a:xfrm>
-            <a:off x="971600" y="692696"/>
-            <a:ext cx="6936998" cy="5715000"/>
+            <a:off x="72007" y="1268760"/>
+            <a:ext cx="8964489" cy="4790626"/>
           </a:xfrm>
           <a:prstGeom prst="rect">
             <a:avLst/>
@@ -5975,7 +5995,7 @@
       </p:pic>
       <p:pic>
         <p:nvPicPr>
-          <p:cNvPr id="28677" name="Picture 5" descr="http://myfreebsd.ru/wp-content/uploads/subversion1-300x259.png"/>
+          <p:cNvPr id="28678" name="Picture 6" descr="C:\Users\Алёна\Presentation\Logo\20130718-a48e96460c1323e57ff8cb29b43f6358156aff5c577e1b94c785c57-1024.png"/>
           <p:cNvPicPr>
             <a:picLocks noChangeAspect="1" noChangeArrowheads="1"/>
           </p:cNvPicPr>
@@ -5983,32 +6003,6 @@
         </p:nvPicPr>
         <p:blipFill>
           <a:blip r:embed="rId5" cstate="print"/>
-          <a:srcRect/>
-          <a:stretch>
-            <a:fillRect/>
-          </a:stretch>
-        </p:blipFill>
-        <p:spPr bwMode="auto">
-          <a:xfrm>
-            <a:off x="2786812" y="1412777"/>
-            <a:ext cx="417035" cy="360040"/>
-          </a:xfrm>
-          <a:prstGeom prst="rect">
-            <a:avLst/>
-          </a:prstGeom>
-          <a:noFill/>
-        </p:spPr>
-      </p:pic>
-      <p:pic>
-        <p:nvPicPr>
-          <p:cNvPr id="28678" name="Picture 6" descr="C:\Users\Алёна\Presentation\Logo\20130718-a48e96460c1323e57ff8cb29b43f6358156aff5c577e1b94c785c57-1024.png"/>
-          <p:cNvPicPr>
-            <a:picLocks noChangeAspect="1" noChangeArrowheads="1"/>
-          </p:cNvPicPr>
-          <p:nvPr/>
-        </p:nvPicPr>
-        <p:blipFill>
-          <a:blip r:embed="rId6" cstate="print"/>
           <a:srcRect/>
           <a:stretch>
             <a:fillRect/>
@@ -6034,7 +6028,7 @@
           <p:nvPr/>
         </p:nvPicPr>
         <p:blipFill>
-          <a:blip r:embed="rId7" cstate="print"/>
+          <a:blip r:embed="rId6" cstate="print"/>
           <a:srcRect/>
           <a:stretch>
             <a:fillRect/>
@@ -6044,6 +6038,32 @@
           <a:xfrm>
             <a:off x="1187624" y="1988840"/>
             <a:ext cx="861636" cy="504056"/>
+          </a:xfrm>
+          <a:prstGeom prst="rect">
+            <a:avLst/>
+          </a:prstGeom>
+          <a:noFill/>
+        </p:spPr>
+      </p:pic>
+      <p:pic>
+        <p:nvPicPr>
+          <p:cNvPr id="4098" name="Picture 2" descr="http://airpair-blog.s3.amazonaws.com/wp-content/uploads/2014/03/sendgrid-logo-2.png"/>
+          <p:cNvPicPr>
+            <a:picLocks noChangeAspect="1" noChangeArrowheads="1"/>
+          </p:cNvPicPr>
+          <p:nvPr/>
+        </p:nvPicPr>
+        <p:blipFill>
+          <a:blip r:embed="rId7" cstate="print"/>
+          <a:srcRect/>
+          <a:stretch>
+            <a:fillRect/>
+          </a:stretch>
+        </p:blipFill>
+        <p:spPr bwMode="auto">
+          <a:xfrm>
+            <a:off x="2699792" y="1412776"/>
+            <a:ext cx="576064" cy="349486"/>
           </a:xfrm>
           <a:prstGeom prst="rect">
             <a:avLst/>
@@ -8888,8 +8908,8 @@
         </p:nvSpPr>
         <p:spPr bwMode="auto">
           <a:xfrm>
-            <a:off x="6228184" y="4077072"/>
-            <a:ext cx="2113079" cy="646331"/>
+            <a:off x="6271530" y="4077072"/>
+            <a:ext cx="2069733" cy="646331"/>
           </a:xfrm>
           <a:prstGeom prst="rect">
             <a:avLst/>
@@ -8909,25 +8929,27 @@
           </a:bodyPr>
           <a:lstStyle/>
           <a:p>
+            <a:pPr algn="ctr"/>
             <a:r>
               <a:rPr lang="ru-RU" b="1" dirty="0" smtClean="0">
                 <a:solidFill>
                   <a:srgbClr val="5F5F5F"/>
                 </a:solidFill>
               </a:rPr>
-              <a:t>Подписки на </a:t>
-            </a:r>
-          </a:p>
-          <a:p>
+              <a:t>Комментирование</a:t>
+            </a:r>
+          </a:p>
+          <a:p>
+            <a:pPr algn="ctr"/>
             <a:r>
               <a:rPr lang="ru-RU" b="1" dirty="0" smtClean="0">
                 <a:solidFill>
                   <a:srgbClr val="5F5F5F"/>
                 </a:solidFill>
               </a:rPr>
-              <a:t>изменения файлов</a:t>
-            </a:r>
-            <a:endParaRPr lang="en-US" b="1" dirty="0">
+              <a:t>ревизий</a:t>
+            </a:r>
+            <a:endParaRPr lang="en-US" b="1" dirty="0" smtClean="0">
               <a:solidFill>
                 <a:srgbClr val="5F5F5F"/>
               </a:solidFill>
@@ -8945,8 +8967,8 @@
         </p:nvSpPr>
         <p:spPr bwMode="auto">
           <a:xfrm>
-            <a:off x="1143000" y="2439095"/>
-            <a:ext cx="1860381" cy="369332"/>
+            <a:off x="2843808" y="836712"/>
+            <a:ext cx="2250873" cy="646331"/>
           </a:xfrm>
           <a:prstGeom prst="rect">
             <a:avLst/>
@@ -8966,15 +8988,51 @@
           </a:bodyPr>
           <a:lstStyle/>
           <a:p>
+            <a:pPr algn="ctr"/>
+            <a:r>
+              <a:rPr lang="en-US" b="1" dirty="0" smtClean="0">
+                <a:solidFill>
+                  <a:srgbClr val="5F5F5F"/>
+                </a:solidFill>
+              </a:rPr>
+              <a:t>Web-</a:t>
+            </a:r>
             <a:r>
               <a:rPr lang="ru-RU" b="1" dirty="0" smtClean="0">
                 <a:solidFill>
                   <a:srgbClr val="5F5F5F"/>
                 </a:solidFill>
               </a:rPr>
-              <a:t>Просмотр файла</a:t>
-            </a:r>
-            <a:endParaRPr lang="en-US" b="1" dirty="0">
+              <a:t>интерфейс  для</a:t>
+            </a:r>
+          </a:p>
+          <a:p>
+            <a:pPr algn="ctr"/>
+            <a:r>
+              <a:rPr lang="en-US" b="1" dirty="0" err="1" smtClean="0">
+                <a:solidFill>
+                  <a:srgbClr val="5F5F5F"/>
+                </a:solidFill>
+              </a:rPr>
+              <a:t>svn</a:t>
+            </a:r>
+            <a:r>
+              <a:rPr lang="en-US" b="1" dirty="0" smtClean="0">
+                <a:solidFill>
+                  <a:srgbClr val="5F5F5F"/>
+                </a:solidFill>
+              </a:rPr>
+              <a:t>-</a:t>
+            </a:r>
+            <a:r>
+              <a:rPr lang="ru-RU" b="1" dirty="0" err="1" smtClean="0">
+                <a:solidFill>
+                  <a:srgbClr val="5F5F5F"/>
+                </a:solidFill>
+              </a:rPr>
+              <a:t>репозитория</a:t>
+            </a:r>
+            <a:endParaRPr lang="ru-RU" b="1" dirty="0" smtClean="0">
               <a:solidFill>
                 <a:srgbClr val="5F5F5F"/>
               </a:solidFill>
@@ -8992,8 +9050,8 @@
         </p:nvSpPr>
         <p:spPr bwMode="auto">
           <a:xfrm>
-            <a:off x="1259632" y="4365104"/>
-            <a:ext cx="2069734" cy="646331"/>
+            <a:off x="1115616" y="4365104"/>
+            <a:ext cx="2289409" cy="369332"/>
           </a:xfrm>
           <a:prstGeom prst="rect">
             <a:avLst/>
@@ -9013,29 +9071,23 @@
           </a:bodyPr>
           <a:lstStyle/>
           <a:p>
-            <a:pPr algn="r"/>
             <a:r>
               <a:rPr lang="ru-RU" b="1" dirty="0" smtClean="0">
                 <a:solidFill>
-                  <a:srgbClr val="5F5F5F"/>
+                  <a:schemeClr val="tx1">
+                    <a:lumMod val="65000"/>
+                    <a:lumOff val="35000"/>
+                  </a:schemeClr>
                 </a:solidFill>
               </a:rPr>
-              <a:t>Комментирование</a:t>
-            </a:r>
-          </a:p>
-          <a:p>
-            <a:pPr algn="r"/>
-            <a:r>
-              <a:rPr lang="ru-RU" b="1" dirty="0" smtClean="0">
-                <a:solidFill>
-                  <a:srgbClr val="5F5F5F"/>
-                </a:solidFill>
-              </a:rPr>
-              <a:t>ревизий</a:t>
-            </a:r>
-            <a:endParaRPr lang="en-US" b="1" dirty="0">
+              <a:t>Администрирование</a:t>
+            </a:r>
+            <a:endParaRPr lang="ru-RU" b="1" dirty="0">
               <a:solidFill>
-                <a:srgbClr val="5F5F5F"/>
+                <a:schemeClr val="tx1">
+                  <a:lumMod val="65000"/>
+                  <a:lumOff val="35000"/>
+                </a:schemeClr>
               </a:solidFill>
             </a:endParaRPr>
           </a:p>
@@ -9078,15 +9130,7 @@
                   <a:srgbClr val="5F5F5F"/>
                 </a:solidFill>
               </a:rPr>
-              <a:t>Оповещения по </a:t>
-            </a:r>
-            <a:r>
-              <a:rPr lang="en-US" b="1" dirty="0" smtClean="0">
-                <a:solidFill>
-                  <a:srgbClr val="5F5F5F"/>
-                </a:solidFill>
-              </a:rPr>
-              <a:t>e-mail</a:t>
+              <a:t>Просмотр файла</a:t>
             </a:r>
             <a:endParaRPr lang="en-US" b="1" dirty="0">
               <a:solidFill>
@@ -9107,7 +9151,7 @@
         <p:spPr bwMode="auto">
           <a:xfrm>
             <a:off x="5868144" y="1844824"/>
-            <a:ext cx="2250873" cy="646331"/>
+            <a:ext cx="2518638" cy="923330"/>
           </a:xfrm>
           <a:prstGeom prst="rect">
             <a:avLst/>
@@ -9127,53 +9171,50 @@
           </a:bodyPr>
           <a:lstStyle/>
           <a:p>
+            <a:pPr algn="ctr"/>
+            <a:r>
+              <a:rPr lang="ru-RU" b="1" dirty="0" smtClean="0">
+                <a:solidFill>
+                  <a:srgbClr val="5F5F5F"/>
+                </a:solidFill>
+              </a:rPr>
+              <a:t>Оповещения </a:t>
+            </a:r>
+            <a:endParaRPr lang="ru-RU" b="1" dirty="0" smtClean="0">
+              <a:solidFill>
+                <a:srgbClr val="5F5F5F"/>
+              </a:solidFill>
+            </a:endParaRPr>
+          </a:p>
+          <a:p>
+            <a:pPr algn="ctr"/>
+            <a:r>
+              <a:rPr lang="ru-RU" b="1" dirty="0" smtClean="0">
+                <a:solidFill>
+                  <a:srgbClr val="5F5F5F"/>
+                </a:solidFill>
+              </a:rPr>
+              <a:t>об изменениях файлов</a:t>
+            </a:r>
+          </a:p>
+          <a:p>
+            <a:pPr algn="ctr"/>
+            <a:r>
+              <a:rPr lang="ru-RU" b="1" dirty="0" smtClean="0">
+                <a:solidFill>
+                  <a:srgbClr val="5F5F5F"/>
+                </a:solidFill>
+              </a:rPr>
+              <a:t>по </a:t>
+            </a:r>
             <a:r>
               <a:rPr lang="en-US" b="1" dirty="0" smtClean="0">
                 <a:solidFill>
                   <a:srgbClr val="5F5F5F"/>
                 </a:solidFill>
               </a:rPr>
-              <a:t>Web-</a:t>
-            </a:r>
-            <a:r>
-              <a:rPr lang="ru-RU" b="1" dirty="0" smtClean="0">
-                <a:solidFill>
-                  <a:srgbClr val="5F5F5F"/>
-                </a:solidFill>
-              </a:rPr>
-              <a:t>интерфейс  для</a:t>
-            </a:r>
-          </a:p>
-          <a:p>
-            <a:r>
-              <a:rPr lang="en-US" b="1" dirty="0" err="1" smtClean="0">
-                <a:solidFill>
-                  <a:srgbClr val="5F5F5F"/>
-                </a:solidFill>
-              </a:rPr>
-              <a:t>svn</a:t>
-            </a:r>
-            <a:r>
-              <a:rPr lang="en-US" b="1" dirty="0" smtClean="0">
-                <a:solidFill>
-                  <a:srgbClr val="5F5F5F"/>
-                </a:solidFill>
-              </a:rPr>
-              <a:t>-</a:t>
-            </a:r>
-            <a:r>
-              <a:rPr lang="ru-RU" b="1" dirty="0" err="1" smtClean="0">
-                <a:solidFill>
-                  <a:srgbClr val="5F5F5F"/>
-                </a:solidFill>
-              </a:rPr>
-              <a:t>репозитория</a:t>
-            </a:r>
-            <a:endParaRPr lang="en-US" b="1" dirty="0">
-              <a:solidFill>
-                <a:srgbClr val="5F5F5F"/>
-              </a:solidFill>
-            </a:endParaRPr>
+              <a:t>e-mail</a:t>
+            </a:r>
           </a:p>
         </p:txBody>
       </p:sp>
@@ -9243,36 +9284,50 @@
         </p:nvSpPr>
         <p:spPr>
           <a:xfrm>
-            <a:off x="2771800" y="1124744"/>
-            <a:ext cx="2289409" cy="369332"/>
+            <a:off x="755576" y="2276872"/>
+            <a:ext cx="2113079" cy="646331"/>
           </a:xfrm>
           <a:prstGeom prst="rect">
             <a:avLst/>
           </a:prstGeom>
         </p:spPr>
         <p:txBody>
-          <a:bodyPr wrap="none">
+          <a:bodyPr wrap="square">
             <a:spAutoFit/>
           </a:bodyPr>
           <a:lstStyle/>
           <a:p>
+            <a:pPr algn="ctr"/>
             <a:r>
               <a:rPr lang="ru-RU" b="1" dirty="0" smtClean="0">
                 <a:solidFill>
-                  <a:schemeClr val="tx1">
-                    <a:lumMod val="65000"/>
-                    <a:lumOff val="35000"/>
-                  </a:schemeClr>
+                  <a:srgbClr val="5F5F5F"/>
                 </a:solidFill>
               </a:rPr>
-              <a:t>Администрирование</a:t>
-            </a:r>
-            <a:endParaRPr lang="ru-RU" b="1" dirty="0">
+              <a:t>Подписки </a:t>
+            </a:r>
+            <a:r>
+              <a:rPr lang="ru-RU" b="1" dirty="0" smtClean="0">
+                <a:solidFill>
+                  <a:srgbClr val="5F5F5F"/>
+                </a:solidFill>
+              </a:rPr>
+              <a:t>на </a:t>
+            </a:r>
+          </a:p>
+          <a:p>
+            <a:pPr algn="ctr"/>
+            <a:r>
+              <a:rPr lang="ru-RU" b="1" dirty="0" smtClean="0">
+                <a:solidFill>
+                  <a:srgbClr val="5F5F5F"/>
+                </a:solidFill>
+              </a:rPr>
+              <a:t>изменения файлов</a:t>
+            </a:r>
+            <a:endParaRPr lang="en-US" b="1" dirty="0" smtClean="0">
               <a:solidFill>
-                <a:schemeClr val="tx1">
-                  <a:lumMod val="65000"/>
-                  <a:lumOff val="35000"/>
-                </a:schemeClr>
+                <a:srgbClr val="5F5F5F"/>
               </a:solidFill>
             </a:endParaRPr>
           </a:p>
@@ -11244,8 +11299,27 @@
             </a:pPr>
             <a:r>
               <a:rPr lang="en-US" sz="2800" b="0" dirty="0" smtClean="0"/>
-              <a:t>Generated DAL Entities (JPA)</a:t>
-            </a:r>
+              <a:t>Generated DAL Entities (JPA</a:t>
+            </a:r>
+            <a:r>
+              <a:rPr lang="en-US" sz="2800" b="0" dirty="0" smtClean="0"/>
+              <a:t>)</a:t>
+            </a:r>
+          </a:p>
+          <a:p>
+            <a:pPr>
+              <a:buFont typeface="Arial" pitchFamily="34" charset="0"/>
+              <a:buChar char="•"/>
+            </a:pPr>
+            <a:r>
+              <a:rPr lang="en-US" sz="2800" b="0" dirty="0" smtClean="0"/>
+              <a:t>Hibernate </a:t>
+            </a:r>
+            <a:r>
+              <a:rPr lang="en-US" sz="2800" b="0" dirty="0" smtClean="0"/>
+              <a:t>Tools</a:t>
+            </a:r>
+            <a:endParaRPr lang="en-US" sz="2800" b="0" dirty="0" smtClean="0"/>
           </a:p>
           <a:p>
             <a:pPr>

</xml_diff>